<commit_message>
Major Changes: Made small corrections and made some pointing out statements.
Other Changes: Re-formated the directories for better organization of contents. One File Renamed. Included an output-PDF-export folder for the PDF exported file.
</commit_message>
<xml_diff>
--- a/presentation/MS_Elevate_Project-Student_Marks_Result_Analysis-RishitGhosh.pptx
+++ b/presentation/MS_Elevate_Project-Student_Marks_Result_Analysis-RishitGhosh.pptx
@@ -3199,20 +3199,32 @@
           </p:cNvPicPr>
           <p:nvPr/>
         </p:nvPicPr>
-        <p:blipFill>
-          <a:blip r:embed="rId5"/>
+        <p:blipFill rotWithShape="1">
+          <a:blip r:embed="rId5">
+            <a:extLst>
+              <a:ext uri="{28A0092B-C50C-407E-A947-70E740481C1C}">
+                <a14:useLocalDpi xmlns:a14="http://schemas.microsoft.com/office/drawing/2010/main" val="0"/>
+              </a:ext>
+            </a:extLst>
+          </a:blip>
+          <a:srcRect l="3105" t="3736" r="4094" b="4192"/>
           <a:stretch>
             <a:fillRect/>
           </a:stretch>
         </p:blipFill>
         <p:spPr>
           <a:xfrm>
-            <a:off x="6409990" y="963029"/>
-            <a:ext cx="4590784" cy="4936489"/>
+            <a:off x="6951630" y="1147482"/>
+            <a:ext cx="3470520" cy="4545104"/>
           </a:xfrm>
           <a:prstGeom prst="rect">
             <a:avLst/>
           </a:prstGeom>
+          <a:ln>
+            <a:solidFill>
+              <a:schemeClr val="tx1"/>
+            </a:solidFill>
+          </a:ln>
         </p:spPr>
       </p:pic>
     </p:spTree>
@@ -3319,7 +3331,7 @@
         </p:spPr>
         <p:txBody>
           <a:bodyPr vert="horz" lIns="91440" tIns="45720" rIns="91440" bIns="45720" rtlCol="0" anchor="t">
-            <a:normAutofit fontScale="85000" lnSpcReduction="20000"/>
+            <a:normAutofit fontScale="55000" lnSpcReduction="20000"/>
           </a:bodyPr>
           <a:lstStyle/>
           <a:p>
@@ -3327,21 +3339,42 @@
               <a:buNone/>
             </a:pPr>
             <a:r>
-              <a:rPr lang="en-IN" sz="2200" dirty="0">
-                <a:latin typeface="Franklin Gothic Book"/>
-              </a:rPr>
-              <a:t>List and cite relevant sources, research papers, and articles that were instrumental in developing the proposed solution. This could include academic papers on bike demand prediction, machine learning algorithms, and best practices in data preprocessing and model evaluation.</a:t>
-            </a:r>
-            <a:endParaRPr lang="en-US" sz="2200" dirty="0">
-              <a:latin typeface="Aptos" panose="020B0004020202020204"/>
-            </a:endParaRPr>
+              <a:rPr lang="en-IN" u="sng" dirty="0"/>
+              <a:t>https://learn.microsoft.com/en-us/power-bi/</a:t>
+            </a:r>
+            <a:endParaRPr lang="en-IN" dirty="0"/>
           </a:p>
           <a:p>
             <a:pPr marL="0" indent="0">
               <a:buNone/>
             </a:pPr>
             <a:r>
+              <a:rPr lang="en-IN" u="sng" dirty="0"/>
+              <a:t>https://learn.microsoft.com/en-us/training/modules/introduction-power-bi/</a:t>
+            </a:r>
+            <a:endParaRPr lang="en-IN" dirty="0"/>
+          </a:p>
+          <a:p>
+            <a:pPr marL="0" indent="0">
+              <a:buNone/>
+            </a:pPr>
+            <a:r>
               <a:rPr lang="en-IN" sz="2200" dirty="0">
+                <a:latin typeface="Franklin Gothic Book"/>
+                <a:hlinkClick r:id="rId2"/>
+              </a:rPr>
+              <a:t>https://www.geeksforgeeks.org/power-bi/power-bi-tutorial/</a:t>
+            </a:r>
+            <a:endParaRPr lang="en-IN" sz="2200" dirty="0">
+              <a:latin typeface="Franklin Gothic Book"/>
+            </a:endParaRPr>
+          </a:p>
+          <a:p>
+            <a:pPr marL="0" indent="0">
+              <a:buNone/>
+            </a:pPr>
+            <a:r>
+              <a:rPr lang="en-IN" sz="2200" b="1" dirty="0">
                 <a:latin typeface="Franklin Gothic Book"/>
               </a:rPr>
               <a:t>GitHub Link:</a:t>
@@ -3356,30 +3389,12 @@
               <a:t> </a:t>
             </a:r>
             <a:r>
-              <a:rPr lang="en-IN" sz="2200" u="sng" dirty="0">
-                <a:solidFill>
-                  <a:srgbClr val="0070C0"/>
-                </a:solidFill>
+              <a:rPr lang="en-IN" sz="2200" dirty="0">
                 <a:latin typeface="Franklin Gothic Book"/>
+                <a:hlinkClick r:id="rId3"/>
               </a:rPr>
               <a:t>Link</a:t>
             </a:r>
-          </a:p>
-          <a:p>
-            <a:pPr marL="0" indent="0">
-              <a:buNone/>
-            </a:pPr>
-            <a:endParaRPr lang="en-IN" sz="2200" u="sng" dirty="0">
-              <a:solidFill>
-                <a:srgbClr val="0070C0"/>
-              </a:solidFill>
-              <a:latin typeface="Franklin Gothic Book"/>
-            </a:endParaRPr>
-          </a:p>
-          <a:p>
-            <a:pPr marL="0" indent="0">
-              <a:buNone/>
-            </a:pPr>
             <a:endParaRPr lang="en-IN" sz="2200" dirty="0">
               <a:latin typeface="Franklin Gothic Book"/>
             </a:endParaRPr>
@@ -3401,15 +3416,15 @@
           <p:nvPr/>
         </p:nvPicPr>
         <p:blipFill>
-          <a:blip r:embed="rId2"/>
+          <a:blip r:embed="rId4"/>
           <a:stretch>
             <a:fillRect/>
           </a:stretch>
         </p:blipFill>
         <p:spPr>
           <a:xfrm>
-            <a:off x="3478306" y="2949388"/>
-            <a:ext cx="7431450" cy="3550024"/>
+            <a:off x="950259" y="2949388"/>
+            <a:ext cx="9959497" cy="3550024"/>
           </a:xfrm>
           <a:prstGeom prst="rect">
             <a:avLst/>

</xml_diff>